<commit_message>
added graph to presentation
</commit_message>
<xml_diff>
--- a/docs/WIP/CASA_May4_v1.pptx
+++ b/docs/WIP/CASA_May4_v1.pptx
@@ -24,15 +24,15 @@
   <p:notesSz cx="6797675" cy="9926638"/>
   <p:embeddedFontLst>
     <p:embeddedFont>
-      <p:font typeface="Technika-Bold" panose="00000600000000000000" charset="-18"/>
+      <p:font typeface="Technika" panose="020B0604020202020204" charset="-18"/>
       <p:regular r:id="rId16"/>
+      <p:bold r:id="rId17"/>
+      <p:italic r:id="rId18"/>
+      <p:boldItalic r:id="rId19"/>
     </p:embeddedFont>
     <p:embeddedFont>
-      <p:font typeface="Technika" panose="020B0604020202020204" charset="-18"/>
-      <p:regular r:id="rId17"/>
-      <p:bold r:id="rId18"/>
-      <p:italic r:id="rId19"/>
-      <p:boldItalic r:id="rId20"/>
+      <p:font typeface="Technika-Bold" panose="00000600000000000000" charset="-18"/>
+      <p:regular r:id="rId20"/>
     </p:embeddedFont>
     <p:embeddedFont>
       <p:font typeface="Calibri" panose="020F0502020204030204" pitchFamily="34" charset="0"/>
@@ -431,7 +431,7 @@
           <a:graphicData uri="http://schemas.openxmlformats.org/presentationml/2006/ole">
             <mc:AlternateContent xmlns:mc="http://schemas.openxmlformats.org/markup-compatibility/2006">
               <mc:Choice xmlns:v="urn:schemas-microsoft-com:vml" Requires="v">
-                <p:oleObj spid="_x0000_s25633" name="think-cell Slide" r:id="rId4" imgW="270" imgH="270" progId="TCLayout.ActiveDocument.1">
+                <p:oleObj spid="_x0000_s25634" name="think-cell Slide" r:id="rId4" imgW="270" imgH="270" progId="TCLayout.ActiveDocument.1">
                   <p:embed/>
                 </p:oleObj>
               </mc:Choice>
@@ -1059,7 +1059,7 @@
           <a:graphicData uri="http://schemas.openxmlformats.org/presentationml/2006/ole">
             <mc:AlternateContent xmlns:mc="http://schemas.openxmlformats.org/markup-compatibility/2006">
               <mc:Choice xmlns:v="urn:schemas-microsoft-com:vml" Requires="v">
-                <p:oleObj spid="_x0000_s1130" name="think-cell Slide" r:id="rId9" imgW="270" imgH="270" progId="TCLayout.ActiveDocument.1">
+                <p:oleObj spid="_x0000_s1131" name="think-cell Slide" r:id="rId9" imgW="270" imgH="270" progId="TCLayout.ActiveDocument.1">
                   <p:embed/>
                 </p:oleObj>
               </mc:Choice>
@@ -1805,7 +1805,7 @@
           <a:graphicData uri="http://schemas.openxmlformats.org/presentationml/2006/ole">
             <mc:AlternateContent xmlns:mc="http://schemas.openxmlformats.org/markup-compatibility/2006">
               <mc:Choice xmlns:v="urn:schemas-microsoft-com:vml" Requires="v">
-                <p:oleObj spid="_x0000_s34843" name="think-cell Slide" r:id="rId5" imgW="270" imgH="270" progId="TCLayout.ActiveDocument.1">
+                <p:oleObj spid="_x0000_s34844" name="think-cell Slide" r:id="rId5" imgW="270" imgH="270" progId="TCLayout.ActiveDocument.1">
                   <p:embed/>
                 </p:oleObj>
               </mc:Choice>
@@ -1916,19 +1916,11 @@
           <a:p>
             <a:r>
               <a:rPr lang="en-US" dirty="0" smtClean="0"/>
-              <a:t>Full Project </a:t>
-            </a:r>
-            <a:r>
-              <a:rPr lang="en-US" dirty="0" smtClean="0"/>
-              <a:t>View</a:t>
+              <a:t>Full Project View</a:t>
             </a:r>
             <a:r>
               <a:rPr lang="cs-CZ" dirty="0" smtClean="0"/>
-              <a:t>: </a:t>
-            </a:r>
-            <a:r>
-              <a:rPr lang="cs-CZ" dirty="0" smtClean="0"/>
-              <a:t>Last meeting (20.4.2017)</a:t>
+              <a:t>: Last meeting (20.4.2017)</a:t>
             </a:r>
             <a:endParaRPr lang="cs-CZ" dirty="0"/>
           </a:p>
@@ -4327,7 +4319,7 @@
           <a:graphicData uri="http://schemas.openxmlformats.org/presentationml/2006/ole">
             <mc:AlternateContent xmlns:mc="http://schemas.openxmlformats.org/markup-compatibility/2006">
               <mc:Choice xmlns:v="urn:schemas-microsoft-com:vml" Requires="v">
-                <p:oleObj spid="_x0000_s40963" name="think-cell Slide" r:id="rId5" imgW="270" imgH="270" progId="TCLayout.ActiveDocument.1">
+                <p:oleObj spid="_x0000_s40964" name="think-cell Slide" r:id="rId5" imgW="270" imgH="270" progId="TCLayout.ActiveDocument.1">
                   <p:embed/>
                 </p:oleObj>
               </mc:Choice>
@@ -4438,11 +4430,7 @@
           <a:p>
             <a:r>
               <a:rPr lang="en-US" dirty="0" smtClean="0"/>
-              <a:t>Full Project </a:t>
-            </a:r>
-            <a:r>
-              <a:rPr lang="en-US" dirty="0" smtClean="0"/>
-              <a:t>View</a:t>
+              <a:t>Full Project View</a:t>
             </a:r>
             <a:r>
               <a:rPr lang="cs-CZ" dirty="0" smtClean="0"/>
@@ -6938,7 +6926,7 @@
           <a:graphicData uri="http://schemas.openxmlformats.org/presentationml/2006/ole">
             <mc:AlternateContent xmlns:mc="http://schemas.openxmlformats.org/markup-compatibility/2006">
               <mc:Choice xmlns:v="urn:schemas-microsoft-com:vml" Requires="v">
-                <p:oleObj spid="_x0000_s33823" name="think-cell Slide" r:id="rId5" imgW="270" imgH="270" progId="TCLayout.ActiveDocument.1">
+                <p:oleObj spid="_x0000_s33824" name="think-cell Slide" r:id="rId5" imgW="270" imgH="270" progId="TCLayout.ActiveDocument.1">
                   <p:embed/>
                 </p:oleObj>
               </mc:Choice>
@@ -10260,7 +10248,7 @@
           <a:graphicData uri="http://schemas.openxmlformats.org/presentationml/2006/ole">
             <mc:AlternateContent xmlns:mc="http://schemas.openxmlformats.org/markup-compatibility/2006">
               <mc:Choice xmlns:v="urn:schemas-microsoft-com:vml" Requires="v">
-                <p:oleObj spid="_x0000_s41987" name="think-cell Slide" r:id="rId5" imgW="270" imgH="270" progId="TCLayout.ActiveDocument.1">
+                <p:oleObj spid="_x0000_s41988" name="think-cell Slide" r:id="rId5" imgW="270" imgH="270" progId="TCLayout.ActiveDocument.1">
                   <p:embed/>
                 </p:oleObj>
               </mc:Choice>
@@ -12596,7 +12584,7 @@
           <a:graphicData uri="http://schemas.openxmlformats.org/presentationml/2006/ole">
             <mc:AlternateContent xmlns:mc="http://schemas.openxmlformats.org/markup-compatibility/2006">
               <mc:Choice xmlns:v="urn:schemas-microsoft-com:vml" Requires="v">
-                <p:oleObj spid="_x0000_s6285" name="think-cell Slide" r:id="rId5" imgW="270" imgH="270" progId="TCLayout.ActiveDocument.1">
+                <p:oleObj spid="_x0000_s6286" name="think-cell Slide" r:id="rId5" imgW="270" imgH="270" progId="TCLayout.ActiveDocument.1">
                   <p:embed/>
                 </p:oleObj>
               </mc:Choice>
@@ -13257,11 +13245,7 @@
             </a:r>
             <a:r>
               <a:rPr lang="en-US" sz="2000" b="1" dirty="0" smtClean="0"/>
-              <a:t>overview of </a:t>
-            </a:r>
-            <a:r>
-              <a:rPr lang="en-US" sz="2000" b="1" dirty="0" smtClean="0"/>
-              <a:t>project</a:t>
+              <a:t>overview of project</a:t>
             </a:r>
             <a:r>
               <a:rPr lang="cs-CZ" sz="2000" b="1" dirty="0" smtClean="0"/>
@@ -13856,7 +13840,7 @@
           <a:graphicData uri="http://schemas.openxmlformats.org/presentationml/2006/ole">
             <mc:AlternateContent xmlns:mc="http://schemas.openxmlformats.org/markup-compatibility/2006">
               <mc:Choice xmlns:v="urn:schemas-microsoft-com:vml" Requires="v">
-                <p:oleObj spid="_x0000_s39942" name="think-cell Slide" r:id="rId5" imgW="270" imgH="270" progId="TCLayout.ActiveDocument.1">
+                <p:oleObj spid="_x0000_s39943" name="think-cell Slide" r:id="rId5" imgW="270" imgH="270" progId="TCLayout.ActiveDocument.1">
                   <p:embed/>
                 </p:oleObj>
               </mc:Choice>
@@ -13967,11 +13951,7 @@
           <a:p>
             <a:r>
               <a:rPr lang="en-US" dirty="0" smtClean="0"/>
-              <a:t>Project </a:t>
-            </a:r>
-            <a:r>
-              <a:rPr lang="en-US" dirty="0" smtClean="0"/>
-              <a:t>Team</a:t>
+              <a:t>Project Team</a:t>
             </a:r>
             <a:r>
               <a:rPr lang="cs-CZ" dirty="0" smtClean="0"/>
@@ -15453,7 +15433,7 @@
         </p:blipFill>
         <p:spPr>
           <a:xfrm>
-            <a:off x="1079999" y="2343967"/>
+            <a:off x="321828" y="2308819"/>
             <a:ext cx="4470957" cy="2214586"/>
           </a:xfrm>
           <a:prstGeom prst="rect">
@@ -15540,6 +15520,30 @@
           </a:prstGeom>
         </p:spPr>
       </p:pic>
+      <p:pic>
+        <p:nvPicPr>
+          <p:cNvPr id="3" name="Picture 2"/>
+          <p:cNvPicPr>
+            <a:picLocks noChangeAspect="1"/>
+          </p:cNvPicPr>
+          <p:nvPr/>
+        </p:nvPicPr>
+        <p:blipFill>
+          <a:blip r:embed="rId4"/>
+          <a:stretch>
+            <a:fillRect/>
+          </a:stretch>
+        </p:blipFill>
+        <p:spPr>
+          <a:xfrm>
+            <a:off x="3966883" y="2780880"/>
+            <a:ext cx="4652684" cy="1902329"/>
+          </a:xfrm>
+          <a:prstGeom prst="rect">
+            <a:avLst/>
+          </a:prstGeom>
+        </p:spPr>
+      </p:pic>
     </p:spTree>
     <p:extLst>
       <p:ext uri="{BB962C8B-B14F-4D97-AF65-F5344CB8AC3E}">
@@ -15595,7 +15599,7 @@
           <a:graphicData uri="http://schemas.openxmlformats.org/presentationml/2006/ole">
             <mc:AlternateContent xmlns:mc="http://schemas.openxmlformats.org/markup-compatibility/2006">
               <mc:Choice xmlns:v="urn:schemas-microsoft-com:vml" Requires="v">
-                <p:oleObj spid="_x0000_s31771" name="think-cell Slide" r:id="rId111" imgW="270" imgH="270" progId="TCLayout.ActiveDocument.1">
+                <p:oleObj spid="_x0000_s31772" name="think-cell Slide" r:id="rId111" imgW="270" imgH="270" progId="TCLayout.ActiveDocument.1">
                   <p:embed/>
                 </p:oleObj>
               </mc:Choice>
@@ -27207,7 +27211,7 @@
           <a:graphicData uri="http://schemas.openxmlformats.org/presentationml/2006/ole">
             <mc:AlternateContent xmlns:mc="http://schemas.openxmlformats.org/markup-compatibility/2006">
               <mc:Choice xmlns:v="urn:schemas-microsoft-com:vml" Requires="v">
-                <p:oleObj spid="_x0000_s35851" name="think-cell Slide" r:id="rId5" imgW="270" imgH="270" progId="TCLayout.ActiveDocument.1">
+                <p:oleObj spid="_x0000_s35852" name="think-cell Slide" r:id="rId5" imgW="270" imgH="270" progId="TCLayout.ActiveDocument.1">
                   <p:embed/>
                 </p:oleObj>
               </mc:Choice>

</xml_diff>